<commit_message>
game over, pause, main meny
</commit_message>
<xml_diff>
--- a/2d Projekt/Assets/Sprites/Spritecreator.pptx
+++ b/2d Projekt/Assets/Sprites/Spritecreator.pptx
@@ -12,6 +12,7 @@
     <p:sldId id="260" r:id="rId6"/>
     <p:sldId id="261" r:id="rId7"/>
     <p:sldId id="262" r:id="rId8"/>
+    <p:sldId id="263" r:id="rId9"/>
   </p:sldIdLst>
   <p:sldSz cx="12192000" cy="6858000"/>
   <p:notesSz cx="6858000" cy="9144000"/>
@@ -267,7 +268,7 @@
           <a:p>
             <a:fld id="{6E66F70A-5E0E-461A-B0CB-604740D34008}" type="datetimeFigureOut">
               <a:rPr lang="en-GB" smtClean="0"/>
-              <a:t>16/02/2021</a:t>
+              <a:t>24/02/2021</a:t>
             </a:fld>
             <a:endParaRPr lang="en-GB"/>
           </a:p>
@@ -467,7 +468,7 @@
           <a:p>
             <a:fld id="{6E66F70A-5E0E-461A-B0CB-604740D34008}" type="datetimeFigureOut">
               <a:rPr lang="en-GB" smtClean="0"/>
-              <a:t>16/02/2021</a:t>
+              <a:t>24/02/2021</a:t>
             </a:fld>
             <a:endParaRPr lang="en-GB"/>
           </a:p>
@@ -677,7 +678,7 @@
           <a:p>
             <a:fld id="{6E66F70A-5E0E-461A-B0CB-604740D34008}" type="datetimeFigureOut">
               <a:rPr lang="en-GB" smtClean="0"/>
-              <a:t>16/02/2021</a:t>
+              <a:t>24/02/2021</a:t>
             </a:fld>
             <a:endParaRPr lang="en-GB"/>
           </a:p>
@@ -877,7 +878,7 @@
           <a:p>
             <a:fld id="{6E66F70A-5E0E-461A-B0CB-604740D34008}" type="datetimeFigureOut">
               <a:rPr lang="en-GB" smtClean="0"/>
-              <a:t>16/02/2021</a:t>
+              <a:t>24/02/2021</a:t>
             </a:fld>
             <a:endParaRPr lang="en-GB"/>
           </a:p>
@@ -1153,7 +1154,7 @@
           <a:p>
             <a:fld id="{6E66F70A-5E0E-461A-B0CB-604740D34008}" type="datetimeFigureOut">
               <a:rPr lang="en-GB" smtClean="0"/>
-              <a:t>16/02/2021</a:t>
+              <a:t>24/02/2021</a:t>
             </a:fld>
             <a:endParaRPr lang="en-GB"/>
           </a:p>
@@ -1421,7 +1422,7 @@
           <a:p>
             <a:fld id="{6E66F70A-5E0E-461A-B0CB-604740D34008}" type="datetimeFigureOut">
               <a:rPr lang="en-GB" smtClean="0"/>
-              <a:t>16/02/2021</a:t>
+              <a:t>24/02/2021</a:t>
             </a:fld>
             <a:endParaRPr lang="en-GB"/>
           </a:p>
@@ -1836,7 +1837,7 @@
           <a:p>
             <a:fld id="{6E66F70A-5E0E-461A-B0CB-604740D34008}" type="datetimeFigureOut">
               <a:rPr lang="en-GB" smtClean="0"/>
-              <a:t>16/02/2021</a:t>
+              <a:t>24/02/2021</a:t>
             </a:fld>
             <a:endParaRPr lang="en-GB"/>
           </a:p>
@@ -1978,7 +1979,7 @@
           <a:p>
             <a:fld id="{6E66F70A-5E0E-461A-B0CB-604740D34008}" type="datetimeFigureOut">
               <a:rPr lang="en-GB" smtClean="0"/>
-              <a:t>16/02/2021</a:t>
+              <a:t>24/02/2021</a:t>
             </a:fld>
             <a:endParaRPr lang="en-GB"/>
           </a:p>
@@ -2091,7 +2092,7 @@
           <a:p>
             <a:fld id="{6E66F70A-5E0E-461A-B0CB-604740D34008}" type="datetimeFigureOut">
               <a:rPr lang="en-GB" smtClean="0"/>
-              <a:t>16/02/2021</a:t>
+              <a:t>24/02/2021</a:t>
             </a:fld>
             <a:endParaRPr lang="en-GB"/>
           </a:p>
@@ -2404,7 +2405,7 @@
           <a:p>
             <a:fld id="{6E66F70A-5E0E-461A-B0CB-604740D34008}" type="datetimeFigureOut">
               <a:rPr lang="en-GB" smtClean="0"/>
-              <a:t>16/02/2021</a:t>
+              <a:t>24/02/2021</a:t>
             </a:fld>
             <a:endParaRPr lang="en-GB"/>
           </a:p>
@@ -2693,7 +2694,7 @@
           <a:p>
             <a:fld id="{6E66F70A-5E0E-461A-B0CB-604740D34008}" type="datetimeFigureOut">
               <a:rPr lang="en-GB" smtClean="0"/>
-              <a:t>16/02/2021</a:t>
+              <a:t>24/02/2021</a:t>
             </a:fld>
             <a:endParaRPr lang="en-GB"/>
           </a:p>
@@ -2936,7 +2937,7 @@
           <a:p>
             <a:fld id="{6E66F70A-5E0E-461A-B0CB-604740D34008}" type="datetimeFigureOut">
               <a:rPr lang="en-GB" smtClean="0"/>
-              <a:t>16/02/2021</a:t>
+              <a:t>24/02/2021</a:t>
             </a:fld>
             <a:endParaRPr lang="en-GB"/>
           </a:p>
@@ -5758,49 +5759,83 @@
           </a:p>
         </p:txBody>
       </p:sp>
-      <p:sp>
-        <p:nvSpPr>
-          <p:cNvPr id="66" name="Rektangel 65">
-            <a:extLst>
-              <a:ext uri="{FF2B5EF4-FFF2-40B4-BE49-F238E27FC236}">
-                <a16:creationId xmlns:a16="http://schemas.microsoft.com/office/drawing/2014/main" id="{ACD57D2F-00F0-42AD-98AA-9A4784959A44}"/>
-              </a:ext>
-            </a:extLst>
-          </p:cNvPr>
-          <p:cNvSpPr/>
-          <p:nvPr/>
-        </p:nvSpPr>
-        <p:spPr>
-          <a:xfrm>
-            <a:off x="7229718" y="3812649"/>
-            <a:ext cx="1385903" cy="218661"/>
+      <p:pic>
+        <p:nvPicPr>
+          <p:cNvPr id="3" name="Bildobjekt 2">
+            <a:extLst>
+              <a:ext uri="{FF2B5EF4-FFF2-40B4-BE49-F238E27FC236}">
+                <a16:creationId xmlns:a16="http://schemas.microsoft.com/office/drawing/2014/main" id="{3910EB39-DA0A-4E42-8284-65A4AF59726E}"/>
+              </a:ext>
+            </a:extLst>
+          </p:cNvPr>
+          <p:cNvPicPr>
+            <a:picLocks noChangeAspect="1"/>
+          </p:cNvPicPr>
+          <p:nvPr/>
+        </p:nvPicPr>
+        <p:blipFill rotWithShape="1">
+          <a:blip r:embed="rId2">
+            <a:extLst>
+              <a:ext uri="{28A0092B-C50C-407E-A947-70E740481C1C}">
+                <a14:useLocalDpi xmlns:a14="http://schemas.microsoft.com/office/drawing/2010/main" val="0"/>
+              </a:ext>
+            </a:extLst>
+          </a:blip>
+          <a:srcRect l="387" t="1" r="-387" b="38653"/>
+          <a:stretch/>
+        </p:blipFill>
+        <p:spPr>
+          <a:xfrm>
+            <a:off x="2661318" y="1421477"/>
+            <a:ext cx="2170364" cy="1017275"/>
           </a:xfrm>
           <a:prstGeom prst="rect">
             <a:avLst/>
+          </a:prstGeom>
+        </p:spPr>
+      </p:pic>
+      <p:sp>
+        <p:nvSpPr>
+          <p:cNvPr id="14" name="Parallelltrapets 13">
+            <a:extLst>
+              <a:ext uri="{FF2B5EF4-FFF2-40B4-BE49-F238E27FC236}">
+                <a16:creationId xmlns:a16="http://schemas.microsoft.com/office/drawing/2014/main" id="{6F8B5E42-559A-4B88-8D46-8A3A0C8DA494}"/>
+              </a:ext>
+            </a:extLst>
+          </p:cNvPr>
+          <p:cNvSpPr/>
+          <p:nvPr/>
+        </p:nvSpPr>
+        <p:spPr>
+          <a:xfrm>
+            <a:off x="6865533" y="4082995"/>
+            <a:ext cx="2106420" cy="147364"/>
+          </a:xfrm>
+          <a:prstGeom prst="trapezoid">
+            <a:avLst>
+              <a:gd name="adj" fmla="val 183053"/>
+            </a:avLst>
           </a:prstGeom>
           <a:gradFill>
             <a:gsLst>
-              <a:gs pos="0">
-                <a:schemeClr val="tx1">
-                  <a:lumMod val="50000"/>
-                  <a:lumOff val="50000"/>
-                </a:schemeClr>
-              </a:gs>
-              <a:gs pos="100000">
+              <a:gs pos="85000">
                 <a:schemeClr val="tx1">
                   <a:lumMod val="75000"/>
                   <a:lumOff val="25000"/>
                 </a:schemeClr>
               </a:gs>
+              <a:gs pos="0">
+                <a:schemeClr val="tx1">
+                  <a:lumMod val="65000"/>
+                  <a:lumOff val="35000"/>
+                </a:schemeClr>
+              </a:gs>
             </a:gsLst>
-            <a:lin ang="2700000" scaled="0"/>
+            <a:lin ang="5400000" scaled="1"/>
           </a:gradFill>
           <a:ln>
             <a:solidFill>
-              <a:schemeClr val="tx1">
-                <a:lumMod val="75000"/>
-                <a:lumOff val="25000"/>
-              </a:schemeClr>
+              <a:srgbClr val="404040"/>
             </a:solidFill>
           </a:ln>
         </p:spPr>
@@ -5831,43 +5866,46 @@
       </p:sp>
       <p:sp>
         <p:nvSpPr>
-          <p:cNvPr id="65" name="Parallelltrapets 64">
-            <a:extLst>
-              <a:ext uri="{FF2B5EF4-FFF2-40B4-BE49-F238E27FC236}">
-                <a16:creationId xmlns:a16="http://schemas.microsoft.com/office/drawing/2014/main" id="{3A0E32C4-06A0-4ED5-BCA8-36E54BFFE641}"/>
-              </a:ext>
-            </a:extLst>
-          </p:cNvPr>
-          <p:cNvSpPr/>
-          <p:nvPr/>
-        </p:nvSpPr>
-        <p:spPr>
-          <a:xfrm>
-            <a:off x="6855229" y="3947822"/>
-            <a:ext cx="2137696" cy="294200"/>
+          <p:cNvPr id="37" name="Parallelltrapets 36">
+            <a:extLst>
+              <a:ext uri="{FF2B5EF4-FFF2-40B4-BE49-F238E27FC236}">
+                <a16:creationId xmlns:a16="http://schemas.microsoft.com/office/drawing/2014/main" id="{98EB27E0-D4D0-49D2-B69B-FB31B80F2953}"/>
+              </a:ext>
+            </a:extLst>
+          </p:cNvPr>
+          <p:cNvSpPr/>
+          <p:nvPr/>
+        </p:nvSpPr>
+        <p:spPr>
+          <a:xfrm>
+            <a:off x="3973676" y="4058275"/>
+            <a:ext cx="2106420" cy="147364"/>
           </a:xfrm>
           <a:prstGeom prst="trapezoid">
             <a:avLst>
-              <a:gd name="adj" fmla="val 81384"/>
+              <a:gd name="adj" fmla="val 183053"/>
             </a:avLst>
           </a:prstGeom>
           <a:gradFill>
             <a:gsLst>
+              <a:gs pos="85000">
+                <a:schemeClr val="tx1">
+                  <a:lumMod val="75000"/>
+                  <a:lumOff val="25000"/>
+                </a:schemeClr>
+              </a:gs>
               <a:gs pos="0">
-                <a:srgbClr val="C97553"/>
-              </a:gs>
-              <a:gs pos="100000">
-                <a:srgbClr val="BB5F4D"/>
+                <a:schemeClr val="tx1">
+                  <a:lumMod val="65000"/>
+                  <a:lumOff val="35000"/>
+                </a:schemeClr>
               </a:gs>
             </a:gsLst>
-            <a:lin ang="5400000" scaled="0"/>
+            <a:lin ang="5400000" scaled="1"/>
           </a:gradFill>
           <a:ln>
             <a:solidFill>
-              <a:schemeClr val="tx1">
-                <a:lumMod val="75000"/>
-                <a:lumOff val="25000"/>
-              </a:schemeClr>
+              <a:srgbClr val="404040"/>
             </a:solidFill>
           </a:ln>
         </p:spPr>
@@ -10110,6 +10148,111 @@
           </a:fontRef>
         </p:style>
       </p:cxnSp>
+      <p:sp>
+        <p:nvSpPr>
+          <p:cNvPr id="74" name="Parallelltrapets 73">
+            <a:extLst>
+              <a:ext uri="{FF2B5EF4-FFF2-40B4-BE49-F238E27FC236}">
+                <a16:creationId xmlns:a16="http://schemas.microsoft.com/office/drawing/2014/main" id="{5A5D3024-7A95-488B-8C14-02267B9ABDD8}"/>
+              </a:ext>
+            </a:extLst>
+          </p:cNvPr>
+          <p:cNvSpPr/>
+          <p:nvPr/>
+        </p:nvSpPr>
+        <p:spPr>
+          <a:xfrm>
+            <a:off x="2524408" y="3899276"/>
+            <a:ext cx="2743200" cy="147618"/>
+          </a:xfrm>
+          <a:prstGeom prst="trapezoid">
+            <a:avLst>
+              <a:gd name="adj" fmla="val 183053"/>
+            </a:avLst>
+          </a:prstGeom>
+          <a:gradFill>
+            <a:gsLst>
+              <a:gs pos="85000">
+                <a:schemeClr val="tx1">
+                  <a:lumMod val="65000"/>
+                  <a:lumOff val="35000"/>
+                </a:schemeClr>
+              </a:gs>
+              <a:gs pos="0">
+                <a:schemeClr val="tx1">
+                  <a:lumMod val="50000"/>
+                  <a:lumOff val="50000"/>
+                </a:schemeClr>
+              </a:gs>
+            </a:gsLst>
+            <a:lin ang="5400000" scaled="1"/>
+          </a:gradFill>
+          <a:ln>
+            <a:solidFill>
+              <a:srgbClr val="404040"/>
+            </a:solidFill>
+          </a:ln>
+        </p:spPr>
+        <p:style>
+          <a:lnRef idx="2">
+            <a:schemeClr val="accent1">
+              <a:shade val="50000"/>
+            </a:schemeClr>
+          </a:lnRef>
+          <a:fillRef idx="1">
+            <a:schemeClr val="accent1"/>
+          </a:fillRef>
+          <a:effectRef idx="0">
+            <a:schemeClr val="accent1"/>
+          </a:effectRef>
+          <a:fontRef idx="minor">
+            <a:schemeClr val="lt1"/>
+          </a:fontRef>
+        </p:style>
+        <p:txBody>
+          <a:bodyPr rtlCol="0" anchor="ctr"/>
+          <a:lstStyle/>
+          <a:p>
+            <a:pPr algn="ctr"/>
+            <a:endParaRPr lang="en-GB"/>
+          </a:p>
+        </p:txBody>
+      </p:sp>
+      <p:pic>
+        <p:nvPicPr>
+          <p:cNvPr id="3" name="Bildobjekt 2" descr="En bild som visar text, byggnad, fönster&#10;&#10;Automatiskt genererad beskrivning">
+            <a:extLst>
+              <a:ext uri="{FF2B5EF4-FFF2-40B4-BE49-F238E27FC236}">
+                <a16:creationId xmlns:a16="http://schemas.microsoft.com/office/drawing/2014/main" id="{CD27F886-BE9F-438A-9DD4-259C4D0B6D2E}"/>
+              </a:ext>
+            </a:extLst>
+          </p:cNvPr>
+          <p:cNvPicPr>
+            <a:picLocks noChangeAspect="1"/>
+          </p:cNvPicPr>
+          <p:nvPr/>
+        </p:nvPicPr>
+        <p:blipFill rotWithShape="1">
+          <a:blip r:embed="rId2">
+            <a:extLst>
+              <a:ext uri="{28A0092B-C50C-407E-A947-70E740481C1C}">
+                <a14:useLocalDpi xmlns:a14="http://schemas.microsoft.com/office/drawing/2010/main" val="0"/>
+              </a:ext>
+            </a:extLst>
+          </a:blip>
+          <a:srcRect b="12149"/>
+          <a:stretch/>
+        </p:blipFill>
+        <p:spPr>
+          <a:xfrm>
+            <a:off x="4825423" y="1977567"/>
+            <a:ext cx="3029975" cy="1451434"/>
+          </a:xfrm>
+          <a:prstGeom prst="rect">
+            <a:avLst/>
+          </a:prstGeom>
+        </p:spPr>
+      </p:pic>
     </p:spTree>
     <p:extLst>
       <p:ext uri="{BB962C8B-B14F-4D97-AF65-F5344CB8AC3E}">
@@ -12599,6 +12742,126 @@
     <p:extLst>
       <p:ext uri="{BB962C8B-B14F-4D97-AF65-F5344CB8AC3E}">
         <p14:creationId xmlns:p14="http://schemas.microsoft.com/office/powerpoint/2010/main" val="2688766318"/>
+      </p:ext>
+    </p:extLst>
+  </p:cSld>
+  <p:clrMapOvr>
+    <a:masterClrMapping/>
+  </p:clrMapOvr>
+</p:sld>
+</file>
+
+<file path=ppt/slides/slide8.xml><?xml version="1.0" encoding="utf-8"?>
+<p:sld xmlns:a="http://schemas.openxmlformats.org/drawingml/2006/main" xmlns:r="http://schemas.openxmlformats.org/officeDocument/2006/relationships" xmlns:p="http://schemas.openxmlformats.org/presentationml/2006/main">
+  <p:cSld>
+    <p:spTree>
+      <p:nvGrpSpPr>
+        <p:cNvPr id="1" name=""/>
+        <p:cNvGrpSpPr/>
+        <p:nvPr/>
+      </p:nvGrpSpPr>
+      <p:grpSpPr>
+        <a:xfrm>
+          <a:off x="0" y="0"/>
+          <a:ext cx="0" cy="0"/>
+          <a:chOff x="0" y="0"/>
+          <a:chExt cx="0" cy="0"/>
+        </a:xfrm>
+      </p:grpSpPr>
+      <p:pic>
+        <p:nvPicPr>
+          <p:cNvPr id="75" name="Bildobjekt 74">
+            <a:extLst>
+              <a:ext uri="{FF2B5EF4-FFF2-40B4-BE49-F238E27FC236}">
+                <a16:creationId xmlns:a16="http://schemas.microsoft.com/office/drawing/2014/main" id="{9F71328C-D5AD-473F-B19F-382AEBEAD3BE}"/>
+              </a:ext>
+            </a:extLst>
+          </p:cNvPr>
+          <p:cNvPicPr>
+            <a:picLocks noChangeAspect="1"/>
+          </p:cNvPicPr>
+          <p:nvPr/>
+        </p:nvPicPr>
+        <p:blipFill>
+          <a:blip r:embed="rId2">
+            <a:extLst>
+              <a:ext uri="{28A0092B-C50C-407E-A947-70E740481C1C}">
+                <a14:useLocalDpi xmlns:a14="http://schemas.microsoft.com/office/drawing/2010/main" val="0"/>
+              </a:ext>
+            </a:extLst>
+          </a:blip>
+          <a:stretch>
+            <a:fillRect/>
+          </a:stretch>
+        </p:blipFill>
+        <p:spPr>
+          <a:xfrm rot="5400000">
+            <a:off x="6593116" y="1259115"/>
+            <a:ext cx="5058000" cy="6139769"/>
+          </a:xfrm>
+          <a:prstGeom prst="rect">
+            <a:avLst/>
+          </a:prstGeom>
+        </p:spPr>
+      </p:pic>
+      <p:sp>
+        <p:nvSpPr>
+          <p:cNvPr id="76" name="Rektangel 75">
+            <a:extLst>
+              <a:ext uri="{FF2B5EF4-FFF2-40B4-BE49-F238E27FC236}">
+                <a16:creationId xmlns:a16="http://schemas.microsoft.com/office/drawing/2014/main" id="{E0DDC92A-5BC3-45BD-AB34-305E44BE74E3}"/>
+              </a:ext>
+            </a:extLst>
+          </p:cNvPr>
+          <p:cNvSpPr/>
+          <p:nvPr/>
+        </p:nvSpPr>
+        <p:spPr>
+          <a:xfrm>
+            <a:off x="0" y="1"/>
+            <a:ext cx="12192000" cy="6858000"/>
+          </a:xfrm>
+          <a:prstGeom prst="rect">
+            <a:avLst/>
+          </a:prstGeom>
+          <a:solidFill>
+            <a:schemeClr val="tx1">
+              <a:alpha val="20000"/>
+            </a:schemeClr>
+          </a:solidFill>
+          <a:ln>
+            <a:noFill/>
+          </a:ln>
+        </p:spPr>
+        <p:style>
+          <a:lnRef idx="2">
+            <a:schemeClr val="accent1">
+              <a:shade val="50000"/>
+            </a:schemeClr>
+          </a:lnRef>
+          <a:fillRef idx="1">
+            <a:schemeClr val="accent1"/>
+          </a:fillRef>
+          <a:effectRef idx="0">
+            <a:schemeClr val="accent1"/>
+          </a:effectRef>
+          <a:fontRef idx="minor">
+            <a:schemeClr val="lt1"/>
+          </a:fontRef>
+        </p:style>
+        <p:txBody>
+          <a:bodyPr rtlCol="0" anchor="ctr"/>
+          <a:lstStyle/>
+          <a:p>
+            <a:pPr algn="ctr"/>
+            <a:endParaRPr lang="en-GB"/>
+          </a:p>
+        </p:txBody>
+      </p:sp>
+    </p:spTree>
+    <p:extLst>
+      <p:ext uri="{BB962C8B-B14F-4D97-AF65-F5344CB8AC3E}">
+        <p14:creationId xmlns:p14="http://schemas.microsoft.com/office/powerpoint/2010/main" val="2410673042"/>
       </p:ext>
     </p:extLst>
   </p:cSld>

</xml_diff>